<commit_message>
Correct mistake: MicroPython is a runtime.
</commit_message>
<xml_diff>
--- a/Session 1 - Programing with Python/Programing with Python 101.pptx
+++ b/Session 1 - Programing with Python/Programing with Python 101.pptx
@@ -111,6 +111,11 @@
       </a:defRPr>
     </a:lvl9pPr>
   </p:defaultTextStyle>
+  <p:extLst>
+    <p:ext uri="{EFAFB233-063F-42B5-8137-9DF3F51BA10A}">
+      <p15:sldGuideLst xmlns:p15="http://schemas.microsoft.com/office/powerpoint/2012/main"/>
+    </p:ext>
+  </p:extLst>
 </p:presentation>
 </file>
 
@@ -2689,7 +2694,7 @@
           <a:p>
             <a:fld id="{A2CCD5E0-9C79-46C3-BBE4-D6EAA2886D15}" type="datetimeFigureOut">
               <a:rPr lang="en-GB" smtClean="0"/>
-              <a:t>24/06/2017</a:t>
+              <a:t>04/07/2017</a:t>
             </a:fld>
             <a:endParaRPr lang="en-GB"/>
           </a:p>
@@ -2889,7 +2894,7 @@
           <a:p>
             <a:fld id="{A2CCD5E0-9C79-46C3-BBE4-D6EAA2886D15}" type="datetimeFigureOut">
               <a:rPr lang="en-GB" smtClean="0"/>
-              <a:t>24/06/2017</a:t>
+              <a:t>04/07/2017</a:t>
             </a:fld>
             <a:endParaRPr lang="en-GB"/>
           </a:p>
@@ -3099,7 +3104,7 @@
           <a:p>
             <a:fld id="{A2CCD5E0-9C79-46C3-BBE4-D6EAA2886D15}" type="datetimeFigureOut">
               <a:rPr lang="en-GB" smtClean="0"/>
-              <a:t>24/06/2017</a:t>
+              <a:t>04/07/2017</a:t>
             </a:fld>
             <a:endParaRPr lang="en-GB"/>
           </a:p>
@@ -3299,7 +3304,7 @@
           <a:p>
             <a:fld id="{A2CCD5E0-9C79-46C3-BBE4-D6EAA2886D15}" type="datetimeFigureOut">
               <a:rPr lang="en-GB" smtClean="0"/>
-              <a:t>24/06/2017</a:t>
+              <a:t>04/07/2017</a:t>
             </a:fld>
             <a:endParaRPr lang="en-GB"/>
           </a:p>
@@ -3575,7 +3580,7 @@
           <a:p>
             <a:fld id="{A2CCD5E0-9C79-46C3-BBE4-D6EAA2886D15}" type="datetimeFigureOut">
               <a:rPr lang="en-GB" smtClean="0"/>
-              <a:t>24/06/2017</a:t>
+              <a:t>04/07/2017</a:t>
             </a:fld>
             <a:endParaRPr lang="en-GB"/>
           </a:p>
@@ -3843,7 +3848,7 @@
           <a:p>
             <a:fld id="{A2CCD5E0-9C79-46C3-BBE4-D6EAA2886D15}" type="datetimeFigureOut">
               <a:rPr lang="en-GB" smtClean="0"/>
-              <a:t>24/06/2017</a:t>
+              <a:t>04/07/2017</a:t>
             </a:fld>
             <a:endParaRPr lang="en-GB"/>
           </a:p>
@@ -4258,7 +4263,7 @@
           <a:p>
             <a:fld id="{A2CCD5E0-9C79-46C3-BBE4-D6EAA2886D15}" type="datetimeFigureOut">
               <a:rPr lang="en-GB" smtClean="0"/>
-              <a:t>24/06/2017</a:t>
+              <a:t>04/07/2017</a:t>
             </a:fld>
             <a:endParaRPr lang="en-GB"/>
           </a:p>
@@ -4400,7 +4405,7 @@
           <a:p>
             <a:fld id="{A2CCD5E0-9C79-46C3-BBE4-D6EAA2886D15}" type="datetimeFigureOut">
               <a:rPr lang="en-GB" smtClean="0"/>
-              <a:t>24/06/2017</a:t>
+              <a:t>04/07/2017</a:t>
             </a:fld>
             <a:endParaRPr lang="en-GB"/>
           </a:p>
@@ -4513,7 +4518,7 @@
           <a:p>
             <a:fld id="{A2CCD5E0-9C79-46C3-BBE4-D6EAA2886D15}" type="datetimeFigureOut">
               <a:rPr lang="en-GB" smtClean="0"/>
-              <a:t>24/06/2017</a:t>
+              <a:t>04/07/2017</a:t>
             </a:fld>
             <a:endParaRPr lang="en-GB"/>
           </a:p>
@@ -4826,7 +4831,7 @@
           <a:p>
             <a:fld id="{A2CCD5E0-9C79-46C3-BBE4-D6EAA2886D15}" type="datetimeFigureOut">
               <a:rPr lang="en-GB" smtClean="0"/>
-              <a:t>24/06/2017</a:t>
+              <a:t>04/07/2017</a:t>
             </a:fld>
             <a:endParaRPr lang="en-GB"/>
           </a:p>
@@ -5115,7 +5120,7 @@
           <a:p>
             <a:fld id="{A2CCD5E0-9C79-46C3-BBE4-D6EAA2886D15}" type="datetimeFigureOut">
               <a:rPr lang="en-GB" smtClean="0"/>
-              <a:t>24/06/2017</a:t>
+              <a:t>04/07/2017</a:t>
             </a:fld>
             <a:endParaRPr lang="en-GB"/>
           </a:p>
@@ -5358,7 +5363,7 @@
           <a:p>
             <a:fld id="{A2CCD5E0-9C79-46C3-BBE4-D6EAA2886D15}" type="datetimeFigureOut">
               <a:rPr lang="en-GB" smtClean="0"/>
-              <a:t>24/06/2017</a:t>
+              <a:t>04/07/2017</a:t>
             </a:fld>
             <a:endParaRPr lang="en-GB"/>
           </a:p>
@@ -7456,7 +7461,7 @@
                   <a:schemeClr val="bg1"/>
                 </a:solidFill>
               </a:rPr>
-              <a:t>full Python 3 compiler, written in C </a:t>
+              <a:t>full Python 3 runtime, written in C </a:t>
             </a:r>
           </a:p>
           <a:p>
@@ -7466,7 +7471,23 @@
                   <a:schemeClr val="bg1"/>
                 </a:solidFill>
               </a:rPr>
-              <a:t>runs on the micro-controller hardware. </a:t>
+              <a:t>runs </a:t>
+            </a:r>
+            <a:r>
+              <a:rPr lang="en-GB" sz="2000">
+                <a:solidFill>
+                  <a:schemeClr val="bg1"/>
+                </a:solidFill>
+              </a:rPr>
+              <a:t>on micro-controller </a:t>
+            </a:r>
+            <a:r>
+              <a:rPr lang="en-GB" sz="2000" dirty="0">
+                <a:solidFill>
+                  <a:schemeClr val="bg1"/>
+                </a:solidFill>
+              </a:rPr>
+              <a:t>hardware. </a:t>
             </a:r>
           </a:p>
           <a:p>

</xml_diff>